<commit_message>
Modify navigation image and add alternative proposal
Signed-off-by: Patrick Bloebaum <bloebp@amazon.com>
</commit_message>
<xml_diff>
--- a/docs/source/user_guide/navigation.pptx
+++ b/docs/source/user_guide/navigation.pptx
@@ -197,7 +197,7 @@
           <a:p>
             <a:fld id="{62CD6B6F-168C-EE4C-95D4-529D6D05C8A4}" type="datetimeFigureOut">
               <a:rPr lang="en-US" smtClean="0"/>
-              <a:t>3/22/23</a:t>
+              <a:t>3/24/23</a:t>
             </a:fld>
             <a:endParaRPr lang="en-US"/>
           </a:p>
@@ -695,7 +695,7 @@
           <a:p>
             <a:fld id="{F5074301-D816-A348-AA4A-431BEC99E41A}" type="datetimeFigureOut">
               <a:rPr lang="en-US" smtClean="0"/>
-              <a:t>3/22/23</a:t>
+              <a:t>3/24/23</a:t>
             </a:fld>
             <a:endParaRPr lang="en-US"/>
           </a:p>
@@ -893,7 +893,7 @@
           <a:p>
             <a:fld id="{F5074301-D816-A348-AA4A-431BEC99E41A}" type="datetimeFigureOut">
               <a:rPr lang="en-US" smtClean="0"/>
-              <a:t>3/22/23</a:t>
+              <a:t>3/24/23</a:t>
             </a:fld>
             <a:endParaRPr lang="en-US"/>
           </a:p>
@@ -1101,7 +1101,7 @@
           <a:p>
             <a:fld id="{F5074301-D816-A348-AA4A-431BEC99E41A}" type="datetimeFigureOut">
               <a:rPr lang="en-US" smtClean="0"/>
-              <a:t>3/22/23</a:t>
+              <a:t>3/24/23</a:t>
             </a:fld>
             <a:endParaRPr lang="en-US"/>
           </a:p>
@@ -1299,7 +1299,7 @@
           <a:p>
             <a:fld id="{F5074301-D816-A348-AA4A-431BEC99E41A}" type="datetimeFigureOut">
               <a:rPr lang="en-US" smtClean="0"/>
-              <a:t>3/22/23</a:t>
+              <a:t>3/24/23</a:t>
             </a:fld>
             <a:endParaRPr lang="en-US"/>
           </a:p>
@@ -1574,7 +1574,7 @@
           <a:p>
             <a:fld id="{F5074301-D816-A348-AA4A-431BEC99E41A}" type="datetimeFigureOut">
               <a:rPr lang="en-US" smtClean="0"/>
-              <a:t>3/22/23</a:t>
+              <a:t>3/24/23</a:t>
             </a:fld>
             <a:endParaRPr lang="en-US"/>
           </a:p>
@@ -1839,7 +1839,7 @@
           <a:p>
             <a:fld id="{F5074301-D816-A348-AA4A-431BEC99E41A}" type="datetimeFigureOut">
               <a:rPr lang="en-US" smtClean="0"/>
-              <a:t>3/22/23</a:t>
+              <a:t>3/24/23</a:t>
             </a:fld>
             <a:endParaRPr lang="en-US"/>
           </a:p>
@@ -2251,7 +2251,7 @@
           <a:p>
             <a:fld id="{F5074301-D816-A348-AA4A-431BEC99E41A}" type="datetimeFigureOut">
               <a:rPr lang="en-US" smtClean="0"/>
-              <a:t>3/22/23</a:t>
+              <a:t>3/24/23</a:t>
             </a:fld>
             <a:endParaRPr lang="en-US"/>
           </a:p>
@@ -2392,7 +2392,7 @@
           <a:p>
             <a:fld id="{F5074301-D816-A348-AA4A-431BEC99E41A}" type="datetimeFigureOut">
               <a:rPr lang="en-US" smtClean="0"/>
-              <a:t>3/22/23</a:t>
+              <a:t>3/24/23</a:t>
             </a:fld>
             <a:endParaRPr lang="en-US"/>
           </a:p>
@@ -2505,7 +2505,7 @@
           <a:p>
             <a:fld id="{F5074301-D816-A348-AA4A-431BEC99E41A}" type="datetimeFigureOut">
               <a:rPr lang="en-US" smtClean="0"/>
-              <a:t>3/22/23</a:t>
+              <a:t>3/24/23</a:t>
             </a:fld>
             <a:endParaRPr lang="en-US"/>
           </a:p>
@@ -2816,7 +2816,7 @@
           <a:p>
             <a:fld id="{F5074301-D816-A348-AA4A-431BEC99E41A}" type="datetimeFigureOut">
               <a:rPr lang="en-US" smtClean="0"/>
-              <a:t>3/22/23</a:t>
+              <a:t>3/24/23</a:t>
             </a:fld>
             <a:endParaRPr lang="en-US"/>
           </a:p>
@@ -3104,7 +3104,7 @@
           <a:p>
             <a:fld id="{F5074301-D816-A348-AA4A-431BEC99E41A}" type="datetimeFigureOut">
               <a:rPr lang="en-US" smtClean="0"/>
-              <a:t>3/22/23</a:t>
+              <a:t>3/24/23</a:t>
             </a:fld>
             <a:endParaRPr lang="en-US"/>
           </a:p>
@@ -3345,7 +3345,7 @@
           <a:p>
             <a:fld id="{F5074301-D816-A348-AA4A-431BEC99E41A}" type="datetimeFigureOut">
               <a:rPr lang="en-US" smtClean="0"/>
-              <a:t>3/22/23</a:t>
+              <a:t>3/24/23</a:t>
             </a:fld>
             <a:endParaRPr lang="en-US"/>
           </a:p>
@@ -5008,7 +5008,7 @@
                 <a:ea typeface="Amazon Ember Light" panose="020B0403020204020204" pitchFamily="34" charset="0"/>
                 <a:cs typeface="Amazon Ember Light" panose="020B0403020204020204" pitchFamily="34" charset="0"/>
               </a:rPr>
-              <a:t>Intrinsic Causal Influence</a:t>
+              <a:t>Quantify Causal Contributions</a:t>
             </a:r>
           </a:p>
         </p:txBody>

</xml_diff>